<commit_message>
add ribbon and zuul code
</commit_message>
<xml_diff>
--- a/powerpoints/9_MicroService.pptx
+++ b/powerpoints/9_MicroService.pptx
@@ -851,7 +851,7 @@
             <a:fld id="{B61BEF0D-F0BB-DE4B-95CE-6DB70DBA9567}" type="datetimeFigureOut">
               <a:rPr lang="en-US" dirty="0"/>
               <a:pPr/>
-              <a:t>6/24/2019</a:t>
+              <a:t>6/25/2019</a:t>
             </a:fld>
             <a:endParaRPr lang="en-US" dirty="0"/>
           </a:p>
@@ -1099,7 +1099,7 @@
             <a:fld id="{B61BEF0D-F0BB-DE4B-95CE-6DB70DBA9567}" type="datetimeFigureOut">
               <a:rPr lang="en-US" dirty="0"/>
               <a:pPr/>
-              <a:t>6/24/2019</a:t>
+              <a:t>6/25/2019</a:t>
             </a:fld>
             <a:endParaRPr lang="en-US" dirty="0"/>
           </a:p>
@@ -1410,7 +1410,7 @@
             <a:fld id="{B61BEF0D-F0BB-DE4B-95CE-6DB70DBA9567}" type="datetimeFigureOut">
               <a:rPr lang="en-US" dirty="0"/>
               <a:pPr/>
-              <a:t>6/24/2019</a:t>
+              <a:t>6/25/2019</a:t>
             </a:fld>
             <a:endParaRPr lang="en-US" dirty="0"/>
           </a:p>
@@ -1748,7 +1748,7 @@
             <a:fld id="{B61BEF0D-F0BB-DE4B-95CE-6DB70DBA9567}" type="datetimeFigureOut">
               <a:rPr lang="en-US" dirty="0"/>
               <a:pPr/>
-              <a:t>6/24/2019</a:t>
+              <a:t>6/25/2019</a:t>
             </a:fld>
             <a:endParaRPr lang="en-US" dirty="0"/>
           </a:p>
@@ -2059,7 +2059,7 @@
             <a:fld id="{B61BEF0D-F0BB-DE4B-95CE-6DB70DBA9567}" type="datetimeFigureOut">
               <a:rPr lang="en-US" dirty="0"/>
               <a:pPr/>
-              <a:t>6/24/2019</a:t>
+              <a:t>6/25/2019</a:t>
             </a:fld>
             <a:endParaRPr lang="en-US" dirty="0"/>
           </a:p>
@@ -2449,7 +2449,7 @@
             <a:fld id="{B61BEF0D-F0BB-DE4B-95CE-6DB70DBA9567}" type="datetimeFigureOut">
               <a:rPr lang="en-US" dirty="0"/>
               <a:pPr/>
-              <a:t>6/24/2019</a:t>
+              <a:t>6/25/2019</a:t>
             </a:fld>
             <a:endParaRPr lang="en-US" dirty="0"/>
           </a:p>
@@ -2615,7 +2615,7 @@
           <a:p>
             <a:fld id="{55C6B4A9-1611-4792-9094-5F34BCA07E0B}" type="datetimeFigureOut">
               <a:rPr lang="en-US" dirty="0"/>
-              <a:t>6/24/2019</a:t>
+              <a:t>6/25/2019</a:t>
             </a:fld>
             <a:endParaRPr lang="en-US" dirty="0"/>
           </a:p>
@@ -2791,7 +2791,7 @@
             <a:fld id="{B61BEF0D-F0BB-DE4B-95CE-6DB70DBA9567}" type="datetimeFigureOut">
               <a:rPr lang="en-US" dirty="0"/>
               <a:pPr/>
-              <a:t>6/24/2019</a:t>
+              <a:t>6/25/2019</a:t>
             </a:fld>
             <a:endParaRPr lang="en-US" dirty="0"/>
           </a:p>
@@ -2964,7 +2964,7 @@
             <a:fld id="{B61BEF0D-F0BB-DE4B-95CE-6DB70DBA9567}" type="datetimeFigureOut">
               <a:rPr lang="en-US" dirty="0"/>
               <a:pPr/>
-              <a:t>6/24/2019</a:t>
+              <a:t>6/25/2019</a:t>
             </a:fld>
             <a:endParaRPr lang="en-US" dirty="0"/>
           </a:p>
@@ -3208,7 +3208,7 @@
             <a:fld id="{B61BEF0D-F0BB-DE4B-95CE-6DB70DBA9567}" type="datetimeFigureOut">
               <a:rPr lang="en-US" dirty="0"/>
               <a:pPr/>
-              <a:t>6/24/2019</a:t>
+              <a:t>6/25/2019</a:t>
             </a:fld>
             <a:endParaRPr lang="en-US" dirty="0"/>
           </a:p>
@@ -3436,7 +3436,7 @@
           <a:p>
             <a:fld id="{EB712588-04B1-427B-82EE-E8DB90309F08}" type="datetimeFigureOut">
               <a:rPr lang="en-US" dirty="0"/>
-              <a:t>6/24/2019</a:t>
+              <a:t>6/25/2019</a:t>
             </a:fld>
             <a:endParaRPr lang="en-US" dirty="0"/>
           </a:p>
@@ -3806,7 +3806,7 @@
             <a:fld id="{B61BEF0D-F0BB-DE4B-95CE-6DB70DBA9567}" type="datetimeFigureOut">
               <a:rPr lang="en-US" dirty="0"/>
               <a:pPr/>
-              <a:t>6/24/2019</a:t>
+              <a:t>6/25/2019</a:t>
             </a:fld>
             <a:endParaRPr lang="en-US" dirty="0"/>
           </a:p>
@@ -3926,7 +3926,7 @@
             <a:fld id="{B61BEF0D-F0BB-DE4B-95CE-6DB70DBA9567}" type="datetimeFigureOut">
               <a:rPr lang="en-US" dirty="0"/>
               <a:pPr/>
-              <a:t>6/24/2019</a:t>
+              <a:t>6/25/2019</a:t>
             </a:fld>
             <a:endParaRPr lang="en-US" dirty="0"/>
           </a:p>
@@ -4018,7 +4018,7 @@
             <a:fld id="{B61BEF0D-F0BB-DE4B-95CE-6DB70DBA9567}" type="datetimeFigureOut">
               <a:rPr lang="en-US" dirty="0"/>
               <a:pPr/>
-              <a:t>6/24/2019</a:t>
+              <a:t>6/25/2019</a:t>
             </a:fld>
             <a:endParaRPr lang="en-US" dirty="0"/>
           </a:p>
@@ -4269,7 +4269,7 @@
           <a:p>
             <a:fld id="{42A54C80-263E-416B-A8E0-580EDEADCBDC}" type="datetimeFigureOut">
               <a:rPr lang="en-US" dirty="0"/>
-              <a:t>6/24/2019</a:t>
+              <a:t>6/25/2019</a:t>
             </a:fld>
             <a:endParaRPr lang="en-US" dirty="0"/>
           </a:p>
@@ -4528,7 +4528,7 @@
             <a:fld id="{B61BEF0D-F0BB-DE4B-95CE-6DB70DBA9567}" type="datetimeFigureOut">
               <a:rPr lang="en-US" dirty="0"/>
               <a:pPr/>
-              <a:t>6/24/2019</a:t>
+              <a:t>6/25/2019</a:t>
             </a:fld>
             <a:endParaRPr lang="en-US" dirty="0"/>
           </a:p>
@@ -5268,7 +5268,7 @@
             <a:fld id="{B61BEF0D-F0BB-DE4B-95CE-6DB70DBA9567}" type="datetimeFigureOut">
               <a:rPr lang="en-US" dirty="0"/>
               <a:pPr/>
-              <a:t>6/24/2019</a:t>
+              <a:t>6/25/2019</a:t>
             </a:fld>
             <a:endParaRPr lang="en-US" dirty="0"/>
           </a:p>
@@ -7094,7 +7094,7 @@
         <p:spPr>
           <a:xfrm>
             <a:off x="677334" y="4876800"/>
-            <a:ext cx="5280613" cy="369332"/>
+            <a:ext cx="5408853" cy="369332"/>
           </a:xfrm>
           <a:prstGeom prst="rect">
             <a:avLst/>
@@ -7117,7 +7117,7 @@
                   <a:srgbClr val="FF0000"/>
                 </a:solidFill>
               </a:rPr>
-              <a:t>kafka2 was release in middle 2018</a:t>
+              <a:t>kafka2 was released in middle 2018</a:t>
             </a:r>
           </a:p>
         </p:txBody>

</xml_diff>